<commit_message>
plot what to do
</commit_message>
<xml_diff>
--- a/Workflow.pptx
+++ b/Workflow.pptx
@@ -104,6 +104,11 @@
       </a:defRPr>
     </a:lvl9pPr>
   </p:defaultTextStyle>
+  <p:extLst>
+    <p:ext uri="{EFAFB233-063F-42B5-8137-9DF3F51BA10A}">
+      <p15:sldGuideLst xmlns:p15="http://schemas.microsoft.com/office/powerpoint/2012/main"/>
+    </p:ext>
+  </p:extLst>
 </p:presentation>
 </file>
 
@@ -256,7 +261,7 @@
           <a:p>
             <a:fld id="{E96A3289-0ACC-4387-BBDB-C2D55E2B19F0}" type="datetimeFigureOut">
               <a:rPr lang="en-GB" smtClean="0"/>
-              <a:t>29/12/2021</a:t>
+              <a:t>31/12/2021</a:t>
             </a:fld>
             <a:endParaRPr lang="en-GB"/>
           </a:p>
@@ -456,7 +461,7 @@
           <a:p>
             <a:fld id="{E96A3289-0ACC-4387-BBDB-C2D55E2B19F0}" type="datetimeFigureOut">
               <a:rPr lang="en-GB" smtClean="0"/>
-              <a:t>29/12/2021</a:t>
+              <a:t>31/12/2021</a:t>
             </a:fld>
             <a:endParaRPr lang="en-GB"/>
           </a:p>
@@ -666,7 +671,7 @@
           <a:p>
             <a:fld id="{E96A3289-0ACC-4387-BBDB-C2D55E2B19F0}" type="datetimeFigureOut">
               <a:rPr lang="en-GB" smtClean="0"/>
-              <a:t>29/12/2021</a:t>
+              <a:t>31/12/2021</a:t>
             </a:fld>
             <a:endParaRPr lang="en-GB"/>
           </a:p>
@@ -866,7 +871,7 @@
           <a:p>
             <a:fld id="{E96A3289-0ACC-4387-BBDB-C2D55E2B19F0}" type="datetimeFigureOut">
               <a:rPr lang="en-GB" smtClean="0"/>
-              <a:t>29/12/2021</a:t>
+              <a:t>31/12/2021</a:t>
             </a:fld>
             <a:endParaRPr lang="en-GB"/>
           </a:p>
@@ -1142,7 +1147,7 @@
           <a:p>
             <a:fld id="{E96A3289-0ACC-4387-BBDB-C2D55E2B19F0}" type="datetimeFigureOut">
               <a:rPr lang="en-GB" smtClean="0"/>
-              <a:t>29/12/2021</a:t>
+              <a:t>31/12/2021</a:t>
             </a:fld>
             <a:endParaRPr lang="en-GB"/>
           </a:p>
@@ -1410,7 +1415,7 @@
           <a:p>
             <a:fld id="{E96A3289-0ACC-4387-BBDB-C2D55E2B19F0}" type="datetimeFigureOut">
               <a:rPr lang="en-GB" smtClean="0"/>
-              <a:t>29/12/2021</a:t>
+              <a:t>31/12/2021</a:t>
             </a:fld>
             <a:endParaRPr lang="en-GB"/>
           </a:p>
@@ -1825,7 +1830,7 @@
           <a:p>
             <a:fld id="{E96A3289-0ACC-4387-BBDB-C2D55E2B19F0}" type="datetimeFigureOut">
               <a:rPr lang="en-GB" smtClean="0"/>
-              <a:t>29/12/2021</a:t>
+              <a:t>31/12/2021</a:t>
             </a:fld>
             <a:endParaRPr lang="en-GB"/>
           </a:p>
@@ -1967,7 +1972,7 @@
           <a:p>
             <a:fld id="{E96A3289-0ACC-4387-BBDB-C2D55E2B19F0}" type="datetimeFigureOut">
               <a:rPr lang="en-GB" smtClean="0"/>
-              <a:t>29/12/2021</a:t>
+              <a:t>31/12/2021</a:t>
             </a:fld>
             <a:endParaRPr lang="en-GB"/>
           </a:p>
@@ -2080,7 +2085,7 @@
           <a:p>
             <a:fld id="{E96A3289-0ACC-4387-BBDB-C2D55E2B19F0}" type="datetimeFigureOut">
               <a:rPr lang="en-GB" smtClean="0"/>
-              <a:t>29/12/2021</a:t>
+              <a:t>31/12/2021</a:t>
             </a:fld>
             <a:endParaRPr lang="en-GB"/>
           </a:p>
@@ -2393,7 +2398,7 @@
           <a:p>
             <a:fld id="{E96A3289-0ACC-4387-BBDB-C2D55E2B19F0}" type="datetimeFigureOut">
               <a:rPr lang="en-GB" smtClean="0"/>
-              <a:t>29/12/2021</a:t>
+              <a:t>31/12/2021</a:t>
             </a:fld>
             <a:endParaRPr lang="en-GB"/>
           </a:p>
@@ -2682,7 +2687,7 @@
           <a:p>
             <a:fld id="{E96A3289-0ACC-4387-BBDB-C2D55E2B19F0}" type="datetimeFigureOut">
               <a:rPr lang="en-GB" smtClean="0"/>
-              <a:t>29/12/2021</a:t>
+              <a:t>31/12/2021</a:t>
             </a:fld>
             <a:endParaRPr lang="en-GB"/>
           </a:p>
@@ -2925,7 +2930,7 @@
           <a:p>
             <a:fld id="{E96A3289-0ACC-4387-BBDB-C2D55E2B19F0}" type="datetimeFigureOut">
               <a:rPr lang="en-GB" smtClean="0"/>
-              <a:t>29/12/2021</a:t>
+              <a:t>31/12/2021</a:t>
             </a:fld>
             <a:endParaRPr lang="en-GB"/>
           </a:p>
@@ -3585,6 +3590,251 @@
           </a:fontRef>
         </p:style>
       </p:cxnSp>
+      <p:sp>
+        <p:nvSpPr>
+          <p:cNvPr id="2" name="Rectangle 1">
+            <a:extLst>
+              <a:ext uri="{FF2B5EF4-FFF2-40B4-BE49-F238E27FC236}">
+                <a16:creationId xmlns:a16="http://schemas.microsoft.com/office/drawing/2014/main" id="{6EEABF8D-D59C-438C-99B9-55C33502EF5A}"/>
+              </a:ext>
+            </a:extLst>
+          </p:cNvPr>
+          <p:cNvSpPr/>
+          <p:nvPr/>
+        </p:nvSpPr>
+        <p:spPr>
+          <a:xfrm>
+            <a:off x="872455" y="2306972"/>
+            <a:ext cx="2483141" cy="645953"/>
+          </a:xfrm>
+          <a:prstGeom prst="rect">
+            <a:avLst/>
+          </a:prstGeom>
+        </p:spPr>
+        <p:style>
+          <a:lnRef idx="2">
+            <a:schemeClr val="accent1">
+              <a:shade val="50000"/>
+            </a:schemeClr>
+          </a:lnRef>
+          <a:fillRef idx="1">
+            <a:schemeClr val="accent1"/>
+          </a:fillRef>
+          <a:effectRef idx="0">
+            <a:schemeClr val="accent1"/>
+          </a:effectRef>
+          <a:fontRef idx="minor">
+            <a:schemeClr val="lt1"/>
+          </a:fontRef>
+        </p:style>
+        <p:txBody>
+          <a:bodyPr rtlCol="0" anchor="ctr"/>
+          <a:lstStyle/>
+          <a:p>
+            <a:pPr algn="ctr"/>
+            <a:r>
+              <a:rPr lang="en-GB" dirty="0"/>
+              <a:t>Geographic map</a:t>
+            </a:r>
+          </a:p>
+        </p:txBody>
+      </p:sp>
+      <p:sp>
+        <p:nvSpPr>
+          <p:cNvPr id="3" name="Rectangle 2">
+            <a:extLst>
+              <a:ext uri="{FF2B5EF4-FFF2-40B4-BE49-F238E27FC236}">
+                <a16:creationId xmlns:a16="http://schemas.microsoft.com/office/drawing/2014/main" id="{CA4F6235-DAA8-4BA2-8AF3-3961E61ADE10}"/>
+              </a:ext>
+            </a:extLst>
+          </p:cNvPr>
+          <p:cNvSpPr/>
+          <p:nvPr/>
+        </p:nvSpPr>
+        <p:spPr>
+          <a:xfrm>
+            <a:off x="4311941" y="3087149"/>
+            <a:ext cx="2768367" cy="587229"/>
+          </a:xfrm>
+          <a:prstGeom prst="rect">
+            <a:avLst/>
+          </a:prstGeom>
+        </p:spPr>
+        <p:style>
+          <a:lnRef idx="2">
+            <a:schemeClr val="accent1">
+              <a:shade val="50000"/>
+            </a:schemeClr>
+          </a:lnRef>
+          <a:fillRef idx="1">
+            <a:schemeClr val="accent1"/>
+          </a:fillRef>
+          <a:effectRef idx="0">
+            <a:schemeClr val="accent1"/>
+          </a:effectRef>
+          <a:fontRef idx="minor">
+            <a:schemeClr val="lt1"/>
+          </a:fontRef>
+        </p:style>
+        <p:txBody>
+          <a:bodyPr rtlCol="0" anchor="ctr"/>
+          <a:lstStyle/>
+          <a:p>
+            <a:pPr algn="ctr"/>
+            <a:r>
+              <a:rPr lang="en-GB" dirty="0"/>
+              <a:t>Individual variable plots</a:t>
+            </a:r>
+          </a:p>
+        </p:txBody>
+      </p:sp>
+      <p:sp>
+        <p:nvSpPr>
+          <p:cNvPr id="8" name="Rectangle 7">
+            <a:extLst>
+              <a:ext uri="{FF2B5EF4-FFF2-40B4-BE49-F238E27FC236}">
+                <a16:creationId xmlns:a16="http://schemas.microsoft.com/office/drawing/2014/main" id="{E8230450-3C80-4EAB-AA94-F81EE8CD8B86}"/>
+              </a:ext>
+            </a:extLst>
+          </p:cNvPr>
+          <p:cNvSpPr/>
+          <p:nvPr/>
+        </p:nvSpPr>
+        <p:spPr>
+          <a:xfrm>
+            <a:off x="4311941" y="4026716"/>
+            <a:ext cx="2768367" cy="645953"/>
+          </a:xfrm>
+          <a:prstGeom prst="rect">
+            <a:avLst/>
+          </a:prstGeom>
+        </p:spPr>
+        <p:style>
+          <a:lnRef idx="2">
+            <a:schemeClr val="accent1">
+              <a:shade val="50000"/>
+            </a:schemeClr>
+          </a:lnRef>
+          <a:fillRef idx="1">
+            <a:schemeClr val="accent1"/>
+          </a:fillRef>
+          <a:effectRef idx="0">
+            <a:schemeClr val="accent1"/>
+          </a:effectRef>
+          <a:fontRef idx="minor">
+            <a:schemeClr val="lt1"/>
+          </a:fontRef>
+        </p:style>
+        <p:txBody>
+          <a:bodyPr rtlCol="0" anchor="ctr"/>
+          <a:lstStyle/>
+          <a:p>
+            <a:pPr algn="ctr"/>
+            <a:r>
+              <a:rPr lang="en-GB" dirty="0"/>
+              <a:t>Cluster Local Authorities</a:t>
+            </a:r>
+          </a:p>
+        </p:txBody>
+      </p:sp>
+      <p:sp>
+        <p:nvSpPr>
+          <p:cNvPr id="10" name="Rectangle 9">
+            <a:extLst>
+              <a:ext uri="{FF2B5EF4-FFF2-40B4-BE49-F238E27FC236}">
+                <a16:creationId xmlns:a16="http://schemas.microsoft.com/office/drawing/2014/main" id="{E8AEE464-49BA-4427-93CF-5528249C8AD5}"/>
+              </a:ext>
+            </a:extLst>
+          </p:cNvPr>
+          <p:cNvSpPr/>
+          <p:nvPr/>
+        </p:nvSpPr>
+        <p:spPr>
+          <a:xfrm>
+            <a:off x="1132514" y="5117284"/>
+            <a:ext cx="2659310" cy="645953"/>
+          </a:xfrm>
+          <a:prstGeom prst="rect">
+            <a:avLst/>
+          </a:prstGeom>
+        </p:spPr>
+        <p:style>
+          <a:lnRef idx="2">
+            <a:schemeClr val="accent1">
+              <a:shade val="50000"/>
+            </a:schemeClr>
+          </a:lnRef>
+          <a:fillRef idx="1">
+            <a:schemeClr val="accent1"/>
+          </a:fillRef>
+          <a:effectRef idx="0">
+            <a:schemeClr val="accent1"/>
+          </a:effectRef>
+          <a:fontRef idx="minor">
+            <a:schemeClr val="lt1"/>
+          </a:fontRef>
+        </p:style>
+        <p:txBody>
+          <a:bodyPr rtlCol="0" anchor="ctr"/>
+          <a:lstStyle/>
+          <a:p>
+            <a:pPr algn="ctr"/>
+            <a:r>
+              <a:rPr lang="en-GB" dirty="0"/>
+              <a:t>ARIMA model</a:t>
+            </a:r>
+          </a:p>
+        </p:txBody>
+      </p:sp>
+      <p:sp>
+        <p:nvSpPr>
+          <p:cNvPr id="11" name="Rectangle 10">
+            <a:extLst>
+              <a:ext uri="{FF2B5EF4-FFF2-40B4-BE49-F238E27FC236}">
+                <a16:creationId xmlns:a16="http://schemas.microsoft.com/office/drawing/2014/main" id="{8CA19D9D-D7E4-4157-AC2B-A8397F2F1FF4}"/>
+              </a:ext>
+            </a:extLst>
+          </p:cNvPr>
+          <p:cNvSpPr/>
+          <p:nvPr/>
+        </p:nvSpPr>
+        <p:spPr>
+          <a:xfrm>
+            <a:off x="7180976" y="5117284"/>
+            <a:ext cx="2751589" cy="562064"/>
+          </a:xfrm>
+          <a:prstGeom prst="rect">
+            <a:avLst/>
+          </a:prstGeom>
+        </p:spPr>
+        <p:style>
+          <a:lnRef idx="2">
+            <a:schemeClr val="accent1">
+              <a:shade val="50000"/>
+            </a:schemeClr>
+          </a:lnRef>
+          <a:fillRef idx="1">
+            <a:schemeClr val="accent1"/>
+          </a:fillRef>
+          <a:effectRef idx="0">
+            <a:schemeClr val="accent1"/>
+          </a:effectRef>
+          <a:fontRef idx="minor">
+            <a:schemeClr val="lt1"/>
+          </a:fontRef>
+        </p:style>
+        <p:txBody>
+          <a:bodyPr rtlCol="0" anchor="ctr"/>
+          <a:lstStyle/>
+          <a:p>
+            <a:pPr algn="ctr"/>
+            <a:r>
+              <a:rPr lang="en-GB" dirty="0"/>
+              <a:t>SVR model</a:t>
+            </a:r>
+          </a:p>
+        </p:txBody>
+      </p:sp>
     </p:spTree>
     <p:extLst>
       <p:ext uri="{BB962C8B-B14F-4D97-AF65-F5344CB8AC3E}">

</xml_diff>